<commit_message>
updated packages and wrote the damn thing!
</commit_message>
<xml_diff>
--- a/templates/Crunchbase_PublicCompanyOverview_Template.pptx
+++ b/templates/Crunchbase_PublicCompanyOverview_Template.pptx
@@ -259,7 +259,7 @@
           <a:p>
             <a:fld id="{0593B485-88C3-418C-8DEA-15057496FC6C}" type="datetimeFigureOut">
               <a:rPr lang="en-US" smtClean="0"/>
-              <a:t>5/20/2021</a:t>
+              <a:t>5/21/2021</a:t>
             </a:fld>
             <a:endParaRPr lang="en-US"/>
           </a:p>
@@ -457,7 +457,7 @@
           <a:p>
             <a:fld id="{0593B485-88C3-418C-8DEA-15057496FC6C}" type="datetimeFigureOut">
               <a:rPr lang="en-US" smtClean="0"/>
-              <a:t>5/20/2021</a:t>
+              <a:t>5/21/2021</a:t>
             </a:fld>
             <a:endParaRPr lang="en-US"/>
           </a:p>
@@ -665,7 +665,7 @@
           <a:p>
             <a:fld id="{0593B485-88C3-418C-8DEA-15057496FC6C}" type="datetimeFigureOut">
               <a:rPr lang="en-US" smtClean="0"/>
-              <a:t>5/20/2021</a:t>
+              <a:t>5/21/2021</a:t>
             </a:fld>
             <a:endParaRPr lang="en-US"/>
           </a:p>
@@ -863,7 +863,7 @@
           <a:p>
             <a:fld id="{0593B485-88C3-418C-8DEA-15057496FC6C}" type="datetimeFigureOut">
               <a:rPr lang="en-US" smtClean="0"/>
-              <a:t>5/20/2021</a:t>
+              <a:t>5/21/2021</a:t>
             </a:fld>
             <a:endParaRPr lang="en-US"/>
           </a:p>
@@ -1138,7 +1138,7 @@
           <a:p>
             <a:fld id="{0593B485-88C3-418C-8DEA-15057496FC6C}" type="datetimeFigureOut">
               <a:rPr lang="en-US" smtClean="0"/>
-              <a:t>5/20/2021</a:t>
+              <a:t>5/21/2021</a:t>
             </a:fld>
             <a:endParaRPr lang="en-US"/>
           </a:p>
@@ -1403,7 +1403,7 @@
           <a:p>
             <a:fld id="{0593B485-88C3-418C-8DEA-15057496FC6C}" type="datetimeFigureOut">
               <a:rPr lang="en-US" smtClean="0"/>
-              <a:t>5/20/2021</a:t>
+              <a:t>5/21/2021</a:t>
             </a:fld>
             <a:endParaRPr lang="en-US"/>
           </a:p>
@@ -1815,7 +1815,7 @@
           <a:p>
             <a:fld id="{0593B485-88C3-418C-8DEA-15057496FC6C}" type="datetimeFigureOut">
               <a:rPr lang="en-US" smtClean="0"/>
-              <a:t>5/20/2021</a:t>
+              <a:t>5/21/2021</a:t>
             </a:fld>
             <a:endParaRPr lang="en-US"/>
           </a:p>
@@ -1956,7 +1956,7 @@
           <a:p>
             <a:fld id="{0593B485-88C3-418C-8DEA-15057496FC6C}" type="datetimeFigureOut">
               <a:rPr lang="en-US" smtClean="0"/>
-              <a:t>5/20/2021</a:t>
+              <a:t>5/21/2021</a:t>
             </a:fld>
             <a:endParaRPr lang="en-US"/>
           </a:p>
@@ -2069,7 +2069,7 @@
           <a:p>
             <a:fld id="{0593B485-88C3-418C-8DEA-15057496FC6C}" type="datetimeFigureOut">
               <a:rPr lang="en-US" smtClean="0"/>
-              <a:t>5/20/2021</a:t>
+              <a:t>5/21/2021</a:t>
             </a:fld>
             <a:endParaRPr lang="en-US"/>
           </a:p>
@@ -2380,7 +2380,7 @@
           <a:p>
             <a:fld id="{0593B485-88C3-418C-8DEA-15057496FC6C}" type="datetimeFigureOut">
               <a:rPr lang="en-US" smtClean="0"/>
-              <a:t>5/20/2021</a:t>
+              <a:t>5/21/2021</a:t>
             </a:fld>
             <a:endParaRPr lang="en-US"/>
           </a:p>
@@ -2668,7 +2668,7 @@
           <a:p>
             <a:fld id="{0593B485-88C3-418C-8DEA-15057496FC6C}" type="datetimeFigureOut">
               <a:rPr lang="en-US" smtClean="0"/>
-              <a:t>5/20/2021</a:t>
+              <a:t>5/21/2021</a:t>
             </a:fld>
             <a:endParaRPr lang="en-US"/>
           </a:p>
@@ -2909,7 +2909,7 @@
           <a:p>
             <a:fld id="{0593B485-88C3-418C-8DEA-15057496FC6C}" type="datetimeFigureOut">
               <a:rPr lang="en-US" smtClean="0"/>
-              <a:t>5/20/2021</a:t>
+              <a:t>5/21/2021</a:t>
             </a:fld>
             <a:endParaRPr lang="en-US"/>
           </a:p>
@@ -3381,8 +3381,8 @@
         </p:nvSpPr>
         <p:spPr>
           <a:xfrm>
-            <a:off x="504702" y="1736561"/>
-            <a:ext cx="6020789" cy="1541030"/>
+            <a:off x="504703" y="1476884"/>
+            <a:ext cx="5104375" cy="1541030"/>
           </a:xfrm>
         </p:spPr>
         <p:txBody>
@@ -3400,383 +3400,7 @@
             </a:r>
             <a:r>
               <a:rPr lang="en-US" sz="1400" dirty="0"/>
-              <a:t>Lorem ipsum dolor sit </a:t>
-            </a:r>
-            <a:r>
-              <a:rPr lang="en-US" sz="1400" dirty="0" err="1"/>
-              <a:t>amet</a:t>
-            </a:r>
-            <a:r>
-              <a:rPr lang="en-US" sz="1400" dirty="0"/>
-              <a:t>, </a:t>
-            </a:r>
-            <a:r>
-              <a:rPr lang="en-US" sz="1400" dirty="0" err="1"/>
-              <a:t>consectetur</a:t>
-            </a:r>
-            <a:r>
-              <a:rPr lang="en-US" sz="1400" dirty="0"/>
-              <a:t> </a:t>
-            </a:r>
-            <a:r>
-              <a:rPr lang="en-US" sz="1400" dirty="0" err="1"/>
-              <a:t>adipiscing</a:t>
-            </a:r>
-            <a:r>
-              <a:rPr lang="en-US" sz="1400" dirty="0"/>
-              <a:t> </a:t>
-            </a:r>
-            <a:r>
-              <a:rPr lang="en-US" sz="1400" dirty="0" err="1"/>
-              <a:t>elit</a:t>
-            </a:r>
-            <a:r>
-              <a:rPr lang="en-US" sz="1400" dirty="0"/>
-              <a:t>. Ut </a:t>
-            </a:r>
-            <a:r>
-              <a:rPr lang="en-US" sz="1400" dirty="0" err="1"/>
-              <a:t>rhoncus</a:t>
-            </a:r>
-            <a:r>
-              <a:rPr lang="en-US" sz="1400" dirty="0"/>
-              <a:t> porta </a:t>
-            </a:r>
-            <a:r>
-              <a:rPr lang="en-US" sz="1400" dirty="0" err="1"/>
-              <a:t>arcu</a:t>
-            </a:r>
-            <a:r>
-              <a:rPr lang="en-US" sz="1400" dirty="0"/>
-              <a:t> </a:t>
-            </a:r>
-            <a:r>
-              <a:rPr lang="en-US" sz="1400" dirty="0" err="1"/>
-              <a:t>eu</a:t>
-            </a:r>
-            <a:r>
-              <a:rPr lang="en-US" sz="1400" dirty="0"/>
-              <a:t> </a:t>
-            </a:r>
-            <a:r>
-              <a:rPr lang="en-US" sz="1400" dirty="0" err="1"/>
-              <a:t>placerat</a:t>
-            </a:r>
-            <a:r>
-              <a:rPr lang="en-US" sz="1400" dirty="0"/>
-              <a:t>. Aenean </a:t>
-            </a:r>
-            <a:r>
-              <a:rPr lang="en-US" sz="1400" dirty="0" err="1"/>
-              <a:t>metus</a:t>
-            </a:r>
-            <a:r>
-              <a:rPr lang="en-US" sz="1400" dirty="0"/>
-              <a:t> </a:t>
-            </a:r>
-            <a:r>
-              <a:rPr lang="en-US" sz="1400" dirty="0" err="1"/>
-              <a:t>risus</a:t>
-            </a:r>
-            <a:r>
-              <a:rPr lang="en-US" sz="1400" dirty="0"/>
-              <a:t>, </a:t>
-            </a:r>
-            <a:r>
-              <a:rPr lang="en-US" sz="1400" dirty="0" err="1"/>
-              <a:t>pellentesque</a:t>
-            </a:r>
-            <a:r>
-              <a:rPr lang="en-US" sz="1400" dirty="0"/>
-              <a:t> sit </a:t>
-            </a:r>
-            <a:r>
-              <a:rPr lang="en-US" sz="1400" dirty="0" err="1"/>
-              <a:t>amet</a:t>
-            </a:r>
-            <a:r>
-              <a:rPr lang="en-US" sz="1400" dirty="0"/>
-              <a:t> </a:t>
-            </a:r>
-            <a:r>
-              <a:rPr lang="en-US" sz="1400" dirty="0" err="1"/>
-              <a:t>felis</a:t>
-            </a:r>
-            <a:r>
-              <a:rPr lang="en-US" sz="1400" dirty="0"/>
-              <a:t> </a:t>
-            </a:r>
-            <a:r>
-              <a:rPr lang="en-US" sz="1400" dirty="0" err="1"/>
-              <a:t>eget</a:t>
-            </a:r>
-            <a:r>
-              <a:rPr lang="en-US" sz="1400" dirty="0"/>
-              <a:t>, </a:t>
-            </a:r>
-            <a:r>
-              <a:rPr lang="en-US" sz="1400" dirty="0" err="1"/>
-              <a:t>sodales</a:t>
-            </a:r>
-            <a:r>
-              <a:rPr lang="en-US" sz="1400" dirty="0"/>
-              <a:t> </a:t>
-            </a:r>
-            <a:r>
-              <a:rPr lang="en-US" sz="1400" dirty="0" err="1"/>
-              <a:t>viverra</a:t>
-            </a:r>
-            <a:r>
-              <a:rPr lang="en-US" sz="1400" dirty="0"/>
-              <a:t> </a:t>
-            </a:r>
-            <a:r>
-              <a:rPr lang="en-US" sz="1400" dirty="0" err="1"/>
-              <a:t>nibh</a:t>
-            </a:r>
-            <a:r>
-              <a:rPr lang="en-US" sz="1400" dirty="0"/>
-              <a:t>. Vestibulum </a:t>
-            </a:r>
-            <a:r>
-              <a:rPr lang="en-US" sz="1400" dirty="0" err="1"/>
-              <a:t>ultricies</a:t>
-            </a:r>
-            <a:r>
-              <a:rPr lang="en-US" sz="1400" dirty="0"/>
-              <a:t>, </a:t>
-            </a:r>
-            <a:r>
-              <a:rPr lang="en-US" sz="1400" dirty="0" err="1"/>
-              <a:t>tortor</a:t>
-            </a:r>
-            <a:r>
-              <a:rPr lang="en-US" sz="1400" dirty="0"/>
-              <a:t> id gravida </a:t>
-            </a:r>
-            <a:r>
-              <a:rPr lang="en-US" sz="1400" dirty="0" err="1"/>
-              <a:t>vehicula</a:t>
-            </a:r>
-            <a:r>
-              <a:rPr lang="en-US" sz="1400" dirty="0"/>
-              <a:t>, </a:t>
-            </a:r>
-            <a:r>
-              <a:rPr lang="en-US" sz="1400" dirty="0" err="1"/>
-              <a:t>quam</a:t>
-            </a:r>
-            <a:r>
-              <a:rPr lang="en-US" sz="1400" dirty="0"/>
-              <a:t> </a:t>
-            </a:r>
-            <a:r>
-              <a:rPr lang="en-US" sz="1400" dirty="0" err="1"/>
-              <a:t>massa</a:t>
-            </a:r>
-            <a:r>
-              <a:rPr lang="en-US" sz="1400" dirty="0"/>
-              <a:t> fermentum </a:t>
-            </a:r>
-            <a:r>
-              <a:rPr lang="en-US" sz="1400" dirty="0" err="1"/>
-              <a:t>metus</a:t>
-            </a:r>
-            <a:r>
-              <a:rPr lang="en-US" sz="1400" dirty="0"/>
-              <a:t>, sit </a:t>
-            </a:r>
-            <a:r>
-              <a:rPr lang="en-US" sz="1400" dirty="0" err="1"/>
-              <a:t>amet</a:t>
-            </a:r>
-            <a:r>
-              <a:rPr lang="en-US" sz="1400" dirty="0"/>
-              <a:t> </a:t>
-            </a:r>
-            <a:r>
-              <a:rPr lang="en-US" sz="1400" dirty="0" err="1"/>
-              <a:t>finibus</a:t>
-            </a:r>
-            <a:r>
-              <a:rPr lang="en-US" sz="1400" dirty="0"/>
-              <a:t> </a:t>
-            </a:r>
-            <a:r>
-              <a:rPr lang="en-US" sz="1400" dirty="0" err="1"/>
-              <a:t>metus</a:t>
-            </a:r>
-            <a:r>
-              <a:rPr lang="en-US" sz="1400" dirty="0"/>
-              <a:t> </a:t>
-            </a:r>
-            <a:r>
-              <a:rPr lang="en-US" sz="1400" dirty="0" err="1"/>
-              <a:t>nulla</a:t>
-            </a:r>
-            <a:r>
-              <a:rPr lang="en-US" sz="1400" dirty="0"/>
-              <a:t> </a:t>
-            </a:r>
-            <a:r>
-              <a:rPr lang="en-US" sz="1400" dirty="0" err="1"/>
-              <a:t>molestie</a:t>
-            </a:r>
-            <a:r>
-              <a:rPr lang="en-US" sz="1400" dirty="0"/>
-              <a:t> </a:t>
-            </a:r>
-            <a:r>
-              <a:rPr lang="en-US" sz="1400" dirty="0" err="1"/>
-              <a:t>tortor</a:t>
-            </a:r>
-            <a:r>
-              <a:rPr lang="en-US" sz="1400" dirty="0"/>
-              <a:t>. Donec </a:t>
-            </a:r>
-            <a:r>
-              <a:rPr lang="en-US" sz="1400" dirty="0" err="1"/>
-              <a:t>sagittis</a:t>
-            </a:r>
-            <a:r>
-              <a:rPr lang="en-US" sz="1400" dirty="0"/>
-              <a:t> </a:t>
-            </a:r>
-            <a:r>
-              <a:rPr lang="en-US" sz="1400" dirty="0" err="1"/>
-              <a:t>neque</a:t>
-            </a:r>
-            <a:r>
-              <a:rPr lang="en-US" sz="1400" dirty="0"/>
-              <a:t> </a:t>
-            </a:r>
-            <a:r>
-              <a:rPr lang="en-US" sz="1400" dirty="0" err="1"/>
-              <a:t>nec</a:t>
-            </a:r>
-            <a:r>
-              <a:rPr lang="en-US" sz="1400" dirty="0"/>
-              <a:t> maximus </a:t>
-            </a:r>
-            <a:r>
-              <a:rPr lang="en-US" sz="1400" dirty="0" err="1"/>
-              <a:t>accumsan</a:t>
-            </a:r>
-            <a:r>
-              <a:rPr lang="en-US" sz="1400" dirty="0"/>
-              <a:t>. </a:t>
-            </a:r>
-            <a:r>
-              <a:rPr lang="en-US" sz="1400" dirty="0" err="1"/>
-              <a:t>Aliquam</a:t>
-            </a:r>
-            <a:r>
-              <a:rPr lang="en-US" sz="1400" dirty="0"/>
-              <a:t> </a:t>
-            </a:r>
-            <a:r>
-              <a:rPr lang="en-US" sz="1400" dirty="0" err="1"/>
-              <a:t>placerat</a:t>
-            </a:r>
-            <a:r>
-              <a:rPr lang="en-US" sz="1400" dirty="0"/>
-              <a:t> fermentum </a:t>
-            </a:r>
-            <a:r>
-              <a:rPr lang="en-US" sz="1400" dirty="0" err="1"/>
-              <a:t>luctus</a:t>
-            </a:r>
-            <a:r>
-              <a:rPr lang="en-US" sz="1400" dirty="0"/>
-              <a:t>. </a:t>
-            </a:r>
-            <a:r>
-              <a:rPr lang="en-US" sz="1400" dirty="0" err="1"/>
-              <a:t>Fusce</a:t>
-            </a:r>
-            <a:r>
-              <a:rPr lang="en-US" sz="1400" dirty="0"/>
-              <a:t> et </a:t>
-            </a:r>
-            <a:r>
-              <a:rPr lang="en-US" sz="1400" dirty="0" err="1"/>
-              <a:t>erat</a:t>
-            </a:r>
-            <a:r>
-              <a:rPr lang="en-US" sz="1400" dirty="0"/>
-              <a:t> est. </a:t>
-            </a:r>
-            <a:r>
-              <a:rPr lang="en-US" sz="1400" dirty="0" err="1"/>
-              <a:t>Nulla</a:t>
-            </a:r>
-            <a:r>
-              <a:rPr lang="en-US" sz="1400" dirty="0"/>
-              <a:t> </a:t>
-            </a:r>
-            <a:r>
-              <a:rPr lang="en-US" sz="1400" dirty="0" err="1"/>
-              <a:t>turpis</a:t>
-            </a:r>
-            <a:r>
-              <a:rPr lang="en-US" sz="1400" dirty="0"/>
-              <a:t> dolor, </a:t>
-            </a:r>
-            <a:r>
-              <a:rPr lang="en-US" sz="1400" dirty="0" err="1"/>
-              <a:t>posuere</a:t>
-            </a:r>
-            <a:r>
-              <a:rPr lang="en-US" sz="1400" dirty="0"/>
-              <a:t> vitae libero </a:t>
-            </a:r>
-            <a:r>
-              <a:rPr lang="en-US" sz="1400" dirty="0" err="1"/>
-              <a:t>eu</a:t>
-            </a:r>
-            <a:r>
-              <a:rPr lang="en-US" sz="1400" dirty="0"/>
-              <a:t>, </a:t>
-            </a:r>
-            <a:r>
-              <a:rPr lang="en-US" sz="1400" dirty="0" err="1"/>
-              <a:t>tempor</a:t>
-            </a:r>
-            <a:r>
-              <a:rPr lang="en-US" sz="1400" dirty="0"/>
-              <a:t> </a:t>
-            </a:r>
-            <a:r>
-              <a:rPr lang="en-US" sz="1400" dirty="0" err="1"/>
-              <a:t>sagittis</a:t>
-            </a:r>
-            <a:r>
-              <a:rPr lang="en-US" sz="1400" dirty="0"/>
-              <a:t> libero. Aenean </a:t>
-            </a:r>
-            <a:r>
-              <a:rPr lang="en-US" sz="1400" dirty="0" err="1"/>
-              <a:t>sollicitudin</a:t>
-            </a:r>
-            <a:r>
-              <a:rPr lang="en-US" sz="1400" dirty="0"/>
-              <a:t> </a:t>
-            </a:r>
-            <a:r>
-              <a:rPr lang="en-US" sz="1400" dirty="0" err="1"/>
-              <a:t>bibendum</a:t>
-            </a:r>
-            <a:r>
-              <a:rPr lang="en-US" sz="1400" dirty="0"/>
-              <a:t> </a:t>
-            </a:r>
-            <a:r>
-              <a:rPr lang="en-US" sz="1400" dirty="0" err="1"/>
-              <a:t>rutrum</a:t>
-            </a:r>
-            <a:r>
-              <a:rPr lang="en-US" sz="1400" dirty="0"/>
-              <a:t>.</a:t>
+              <a:t>&lt;Company Background&gt;</a:t>
             </a:r>
           </a:p>
         </p:txBody>
@@ -3854,7 +3478,7 @@
         </p:nvSpPr>
         <p:spPr>
           <a:xfrm>
-            <a:off x="6662058" y="1736561"/>
+            <a:off x="5784245" y="1426105"/>
             <a:ext cx="5415148" cy="1541030"/>
           </a:xfrm>
           <a:prstGeom prst="rect">
@@ -4043,19 +3667,19 @@
           <a:p>
             <a:r>
               <a:rPr lang="en-US" sz="1400" dirty="0"/>
-              <a:t>Article 1 w/Link</a:t>
+              <a:t>&lt;Article 1&gt;</a:t>
             </a:r>
           </a:p>
           <a:p>
             <a:r>
               <a:rPr lang="en-US" sz="1400" dirty="0"/>
-              <a:t>Article 2 w/Link</a:t>
+              <a:t>&lt;Article 2&gt;</a:t>
             </a:r>
           </a:p>
           <a:p>
             <a:r>
               <a:rPr lang="en-US" sz="1400" dirty="0"/>
-              <a:t>Article 3 w/Link</a:t>
+              <a:t>&lt;Article 3&gt;</a:t>
             </a:r>
           </a:p>
         </p:txBody>
@@ -4075,7 +3699,7 @@
           <p:nvPr>
             <p:extLst>
               <p:ext uri="{D42A27DB-BD31-4B8C-83A1-F6EECF244321}">
-                <p14:modId xmlns:p14="http://schemas.microsoft.com/office/powerpoint/2010/main" val="3385462723"/>
+                <p14:modId xmlns:p14="http://schemas.microsoft.com/office/powerpoint/2010/main" val="470938418"/>
               </p:ext>
             </p:extLst>
           </p:nvPr>
@@ -4713,7 +4337,7 @@
                             <a:schemeClr val="tx1"/>
                           </a:solidFill>
                         </a:rPr>
-                        <a:t>&lt;Stock Symbol (ex: NASDAQ:AAPL)&gt;</a:t>
+                        <a:t>&lt;Stock Symbol&gt;</a:t>
                       </a:r>
                     </a:p>
                   </a:txBody>
@@ -4846,7 +4470,7 @@
                             <a:schemeClr val="tx1"/>
                           </a:solidFill>
                         </a:rPr>
-                        <a:t>&lt;Grab from Financials, company name &amp; date&gt;</a:t>
+                        <a:t>&lt;Latest Investment&gt;</a:t>
                       </a:r>
                     </a:p>
                   </a:txBody>
@@ -4979,7 +4603,7 @@
                             <a:schemeClr val="tx1"/>
                           </a:solidFill>
                         </a:rPr>
-                        <a:t>&lt;Grab from Financials, company name &amp; date&gt;</a:t>
+                        <a:t>&lt;Latest Acquisition&gt;</a:t>
                       </a:r>
                     </a:p>
                   </a:txBody>
@@ -5063,8 +4687,8 @@
         </p:blipFill>
         <p:spPr>
           <a:xfrm>
-            <a:off x="5882245" y="3580410"/>
-            <a:ext cx="6099957" cy="2715569"/>
+            <a:off x="5784245" y="3209731"/>
+            <a:ext cx="6146781" cy="3107093"/>
           </a:xfrm>
           <a:prstGeom prst="rect">
             <a:avLst/>

</xml_diff>